<commit_message>
fixed rechtschreibkorrektur in architecture graphic
</commit_message>
<xml_diff>
--- a/documentation/milestone1/07_architecture.pptx
+++ b/documentation/milestone1/07_architecture.pptx
@@ -104,6 +104,11 @@
       </a:defRPr>
     </a:lvl9pPr>
   </p:defaultTextStyle>
+  <p:extLst>
+    <p:ext uri="{EFAFB233-063F-42B5-8137-9DF3F51BA10A}">
+      <p15:sldGuideLst xmlns:p15="http://schemas.microsoft.com/office/powerpoint/2012/main"/>
+    </p:ext>
+  </p:extLst>
 </p:presentation>
 </file>
 
@@ -152,7 +157,6 @@
               <a:rPr lang="de-DE"/>
               <a:t>Titelmasterformat durch Klicken bearbeiten</a:t>
             </a:r>
-            <a:endParaRPr lang="de-DE"/>
           </a:p>
         </p:txBody>
       </p:sp>
@@ -217,7 +221,6 @@
               <a:rPr lang="de-DE"/>
               <a:t>Formatvorlage des Untertitelmasters durch Klicken bearbeiten</a:t>
             </a:r>
-            <a:endParaRPr lang="de-DE"/>
           </a:p>
         </p:txBody>
       </p:sp>
@@ -238,9 +241,9 @@
           <a:p>
             <a:fld id="{D1983C4C-34B0-4116-BBE6-05CA11AAA843}" type="datetimeFigureOut">
               <a:rPr lang="de-DE" smtClean="0"/>
-              <a:t>28.10.2016</a:t>
+              <a:t>31.10.2016</a:t>
             </a:fld>
-            <a:endParaRPr lang="de-DE"/>
+            <a:endParaRPr lang="de-DE" dirty="0"/>
           </a:p>
         </p:txBody>
       </p:sp>
@@ -259,7 +262,7 @@
           <a:bodyPr/>
           <a:lstStyle/>
           <a:p>
-            <a:endParaRPr lang="de-DE"/>
+            <a:endParaRPr lang="de-DE" dirty="0"/>
           </a:p>
         </p:txBody>
       </p:sp>
@@ -282,7 +285,7 @@
               <a:rPr lang="de-DE" smtClean="0"/>
               <a:t>‹Nr.›</a:t>
             </a:fld>
-            <a:endParaRPr lang="de-DE"/>
+            <a:endParaRPr lang="de-DE" dirty="0"/>
           </a:p>
         </p:txBody>
       </p:sp>
@@ -335,7 +338,6 @@
               <a:rPr lang="de-DE"/>
               <a:t>Titelmasterformat durch Klicken bearbeiten</a:t>
             </a:r>
-            <a:endParaRPr lang="de-DE"/>
           </a:p>
         </p:txBody>
       </p:sp>
@@ -387,7 +389,6 @@
               <a:rPr lang="de-DE"/>
               <a:t>Fünfte Ebene</a:t>
             </a:r>
-            <a:endParaRPr lang="de-DE"/>
           </a:p>
         </p:txBody>
       </p:sp>
@@ -408,9 +409,9 @@
           <a:p>
             <a:fld id="{D1983C4C-34B0-4116-BBE6-05CA11AAA843}" type="datetimeFigureOut">
               <a:rPr lang="de-DE" smtClean="0"/>
-              <a:t>28.10.2016</a:t>
+              <a:t>31.10.2016</a:t>
             </a:fld>
-            <a:endParaRPr lang="de-DE"/>
+            <a:endParaRPr lang="de-DE" dirty="0"/>
           </a:p>
         </p:txBody>
       </p:sp>
@@ -429,7 +430,7 @@
           <a:bodyPr/>
           <a:lstStyle/>
           <a:p>
-            <a:endParaRPr lang="de-DE"/>
+            <a:endParaRPr lang="de-DE" dirty="0"/>
           </a:p>
         </p:txBody>
       </p:sp>
@@ -452,7 +453,7 @@
               <a:rPr lang="de-DE" smtClean="0"/>
               <a:t>‹Nr.›</a:t>
             </a:fld>
-            <a:endParaRPr lang="de-DE"/>
+            <a:endParaRPr lang="de-DE" dirty="0"/>
           </a:p>
         </p:txBody>
       </p:sp>
@@ -510,7 +511,6 @@
               <a:rPr lang="de-DE"/>
               <a:t>Titelmasterformat durch Klicken bearbeiten</a:t>
             </a:r>
-            <a:endParaRPr lang="de-DE"/>
           </a:p>
         </p:txBody>
       </p:sp>
@@ -567,7 +567,6 @@
               <a:rPr lang="de-DE"/>
               <a:t>Fünfte Ebene</a:t>
             </a:r>
-            <a:endParaRPr lang="de-DE"/>
           </a:p>
         </p:txBody>
       </p:sp>
@@ -588,9 +587,9 @@
           <a:p>
             <a:fld id="{D1983C4C-34B0-4116-BBE6-05CA11AAA843}" type="datetimeFigureOut">
               <a:rPr lang="de-DE" smtClean="0"/>
-              <a:t>28.10.2016</a:t>
+              <a:t>31.10.2016</a:t>
             </a:fld>
-            <a:endParaRPr lang="de-DE"/>
+            <a:endParaRPr lang="de-DE" dirty="0"/>
           </a:p>
         </p:txBody>
       </p:sp>
@@ -609,7 +608,7 @@
           <a:bodyPr/>
           <a:lstStyle/>
           <a:p>
-            <a:endParaRPr lang="de-DE"/>
+            <a:endParaRPr lang="de-DE" dirty="0"/>
           </a:p>
         </p:txBody>
       </p:sp>
@@ -632,7 +631,7 @@
               <a:rPr lang="de-DE" smtClean="0"/>
               <a:t>‹Nr.›</a:t>
             </a:fld>
-            <a:endParaRPr lang="de-DE"/>
+            <a:endParaRPr lang="de-DE" dirty="0"/>
           </a:p>
         </p:txBody>
       </p:sp>
@@ -685,7 +684,6 @@
               <a:rPr lang="de-DE"/>
               <a:t>Titelmasterformat durch Klicken bearbeiten</a:t>
             </a:r>
-            <a:endParaRPr lang="de-DE"/>
           </a:p>
         </p:txBody>
       </p:sp>
@@ -737,7 +735,6 @@
               <a:rPr lang="de-DE"/>
               <a:t>Fünfte Ebene</a:t>
             </a:r>
-            <a:endParaRPr lang="de-DE"/>
           </a:p>
         </p:txBody>
       </p:sp>
@@ -758,9 +755,9 @@
           <a:p>
             <a:fld id="{D1983C4C-34B0-4116-BBE6-05CA11AAA843}" type="datetimeFigureOut">
               <a:rPr lang="de-DE" smtClean="0"/>
-              <a:t>28.10.2016</a:t>
+              <a:t>31.10.2016</a:t>
             </a:fld>
-            <a:endParaRPr lang="de-DE"/>
+            <a:endParaRPr lang="de-DE" dirty="0"/>
           </a:p>
         </p:txBody>
       </p:sp>
@@ -779,7 +776,7 @@
           <a:bodyPr/>
           <a:lstStyle/>
           <a:p>
-            <a:endParaRPr lang="de-DE"/>
+            <a:endParaRPr lang="de-DE" dirty="0"/>
           </a:p>
         </p:txBody>
       </p:sp>
@@ -802,7 +799,7 @@
               <a:rPr lang="de-DE" smtClean="0"/>
               <a:t>‹Nr.›</a:t>
             </a:fld>
-            <a:endParaRPr lang="de-DE"/>
+            <a:endParaRPr lang="de-DE" dirty="0"/>
           </a:p>
         </p:txBody>
       </p:sp>
@@ -864,7 +861,6 @@
               <a:rPr lang="de-DE"/>
               <a:t>Titelmasterformat durch Klicken bearbeiten</a:t>
             </a:r>
-            <a:endParaRPr lang="de-DE"/>
           </a:p>
         </p:txBody>
       </p:sp>
@@ -1004,9 +1000,9 @@
           <a:p>
             <a:fld id="{D1983C4C-34B0-4116-BBE6-05CA11AAA843}" type="datetimeFigureOut">
               <a:rPr lang="de-DE" smtClean="0"/>
-              <a:t>28.10.2016</a:t>
+              <a:t>31.10.2016</a:t>
             </a:fld>
-            <a:endParaRPr lang="de-DE"/>
+            <a:endParaRPr lang="de-DE" dirty="0"/>
           </a:p>
         </p:txBody>
       </p:sp>
@@ -1025,7 +1021,7 @@
           <a:bodyPr/>
           <a:lstStyle/>
           <a:p>
-            <a:endParaRPr lang="de-DE"/>
+            <a:endParaRPr lang="de-DE" dirty="0"/>
           </a:p>
         </p:txBody>
       </p:sp>
@@ -1048,7 +1044,7 @@
               <a:rPr lang="de-DE" smtClean="0"/>
               <a:t>‹Nr.›</a:t>
             </a:fld>
-            <a:endParaRPr lang="de-DE"/>
+            <a:endParaRPr lang="de-DE" dirty="0"/>
           </a:p>
         </p:txBody>
       </p:sp>
@@ -1101,7 +1097,6 @@
               <a:rPr lang="de-DE"/>
               <a:t>Titelmasterformat durch Klicken bearbeiten</a:t>
             </a:r>
-            <a:endParaRPr lang="de-DE"/>
           </a:p>
         </p:txBody>
       </p:sp>
@@ -1158,7 +1153,6 @@
               <a:rPr lang="de-DE"/>
               <a:t>Fünfte Ebene</a:t>
             </a:r>
-            <a:endParaRPr lang="de-DE"/>
           </a:p>
         </p:txBody>
       </p:sp>
@@ -1215,7 +1209,6 @@
               <a:rPr lang="de-DE"/>
               <a:t>Fünfte Ebene</a:t>
             </a:r>
-            <a:endParaRPr lang="de-DE"/>
           </a:p>
         </p:txBody>
       </p:sp>
@@ -1236,9 +1229,9 @@
           <a:p>
             <a:fld id="{D1983C4C-34B0-4116-BBE6-05CA11AAA843}" type="datetimeFigureOut">
               <a:rPr lang="de-DE" smtClean="0"/>
-              <a:t>28.10.2016</a:t>
+              <a:t>31.10.2016</a:t>
             </a:fld>
-            <a:endParaRPr lang="de-DE"/>
+            <a:endParaRPr lang="de-DE" dirty="0"/>
           </a:p>
         </p:txBody>
       </p:sp>
@@ -1257,7 +1250,7 @@
           <a:bodyPr/>
           <a:lstStyle/>
           <a:p>
-            <a:endParaRPr lang="de-DE"/>
+            <a:endParaRPr lang="de-DE" dirty="0"/>
           </a:p>
         </p:txBody>
       </p:sp>
@@ -1280,7 +1273,7 @@
               <a:rPr lang="de-DE" smtClean="0"/>
               <a:t>‹Nr.›</a:t>
             </a:fld>
-            <a:endParaRPr lang="de-DE"/>
+            <a:endParaRPr lang="de-DE" dirty="0"/>
           </a:p>
         </p:txBody>
       </p:sp>
@@ -1338,7 +1331,6 @@
               <a:rPr lang="de-DE"/>
               <a:t>Titelmasterformat durch Klicken bearbeiten</a:t>
             </a:r>
-            <a:endParaRPr lang="de-DE"/>
           </a:p>
         </p:txBody>
       </p:sp>
@@ -1460,7 +1452,6 @@
               <a:rPr lang="de-DE"/>
               <a:t>Fünfte Ebene</a:t>
             </a:r>
-            <a:endParaRPr lang="de-DE"/>
           </a:p>
         </p:txBody>
       </p:sp>
@@ -1582,7 +1573,6 @@
               <a:rPr lang="de-DE"/>
               <a:t>Fünfte Ebene</a:t>
             </a:r>
-            <a:endParaRPr lang="de-DE"/>
           </a:p>
         </p:txBody>
       </p:sp>
@@ -1603,9 +1593,9 @@
           <a:p>
             <a:fld id="{D1983C4C-34B0-4116-BBE6-05CA11AAA843}" type="datetimeFigureOut">
               <a:rPr lang="de-DE" smtClean="0"/>
-              <a:t>28.10.2016</a:t>
+              <a:t>31.10.2016</a:t>
             </a:fld>
-            <a:endParaRPr lang="de-DE"/>
+            <a:endParaRPr lang="de-DE" dirty="0"/>
           </a:p>
         </p:txBody>
       </p:sp>
@@ -1624,7 +1614,7 @@
           <a:bodyPr/>
           <a:lstStyle/>
           <a:p>
-            <a:endParaRPr lang="de-DE"/>
+            <a:endParaRPr lang="de-DE" dirty="0"/>
           </a:p>
         </p:txBody>
       </p:sp>
@@ -1647,7 +1637,7 @@
               <a:rPr lang="de-DE" smtClean="0"/>
               <a:t>‹Nr.›</a:t>
             </a:fld>
-            <a:endParaRPr lang="de-DE"/>
+            <a:endParaRPr lang="de-DE" dirty="0"/>
           </a:p>
         </p:txBody>
       </p:sp>
@@ -1700,7 +1690,6 @@
               <a:rPr lang="de-DE"/>
               <a:t>Titelmasterformat durch Klicken bearbeiten</a:t>
             </a:r>
-            <a:endParaRPr lang="de-DE"/>
           </a:p>
         </p:txBody>
       </p:sp>
@@ -1721,9 +1710,9 @@
           <a:p>
             <a:fld id="{D1983C4C-34B0-4116-BBE6-05CA11AAA843}" type="datetimeFigureOut">
               <a:rPr lang="de-DE" smtClean="0"/>
-              <a:t>28.10.2016</a:t>
+              <a:t>31.10.2016</a:t>
             </a:fld>
-            <a:endParaRPr lang="de-DE"/>
+            <a:endParaRPr lang="de-DE" dirty="0"/>
           </a:p>
         </p:txBody>
       </p:sp>
@@ -1742,7 +1731,7 @@
           <a:bodyPr/>
           <a:lstStyle/>
           <a:p>
-            <a:endParaRPr lang="de-DE"/>
+            <a:endParaRPr lang="de-DE" dirty="0"/>
           </a:p>
         </p:txBody>
       </p:sp>
@@ -1765,7 +1754,7 @@
               <a:rPr lang="de-DE" smtClean="0"/>
               <a:t>‹Nr.›</a:t>
             </a:fld>
-            <a:endParaRPr lang="de-DE"/>
+            <a:endParaRPr lang="de-DE" dirty="0"/>
           </a:p>
         </p:txBody>
       </p:sp>
@@ -1816,9 +1805,9 @@
           <a:p>
             <a:fld id="{D1983C4C-34B0-4116-BBE6-05CA11AAA843}" type="datetimeFigureOut">
               <a:rPr lang="de-DE" smtClean="0"/>
-              <a:t>28.10.2016</a:t>
+              <a:t>31.10.2016</a:t>
             </a:fld>
-            <a:endParaRPr lang="de-DE"/>
+            <a:endParaRPr lang="de-DE" dirty="0"/>
           </a:p>
         </p:txBody>
       </p:sp>
@@ -1837,7 +1826,7 @@
           <a:bodyPr/>
           <a:lstStyle/>
           <a:p>
-            <a:endParaRPr lang="de-DE"/>
+            <a:endParaRPr lang="de-DE" dirty="0"/>
           </a:p>
         </p:txBody>
       </p:sp>
@@ -1860,7 +1849,7 @@
               <a:rPr lang="de-DE" smtClean="0"/>
               <a:t>‹Nr.›</a:t>
             </a:fld>
-            <a:endParaRPr lang="de-DE"/>
+            <a:endParaRPr lang="de-DE" dirty="0"/>
           </a:p>
         </p:txBody>
       </p:sp>
@@ -1922,7 +1911,6 @@
               <a:rPr lang="de-DE"/>
               <a:t>Titelmasterformat durch Klicken bearbeiten</a:t>
             </a:r>
-            <a:endParaRPr lang="de-DE"/>
           </a:p>
         </p:txBody>
       </p:sp>
@@ -2007,7 +1995,6 @@
               <a:rPr lang="de-DE"/>
               <a:t>Fünfte Ebene</a:t>
             </a:r>
-            <a:endParaRPr lang="de-DE"/>
           </a:p>
         </p:txBody>
       </p:sp>
@@ -2093,9 +2080,9 @@
           <a:p>
             <a:fld id="{D1983C4C-34B0-4116-BBE6-05CA11AAA843}" type="datetimeFigureOut">
               <a:rPr lang="de-DE" smtClean="0"/>
-              <a:t>28.10.2016</a:t>
+              <a:t>31.10.2016</a:t>
             </a:fld>
-            <a:endParaRPr lang="de-DE"/>
+            <a:endParaRPr lang="de-DE" dirty="0"/>
           </a:p>
         </p:txBody>
       </p:sp>
@@ -2114,7 +2101,7 @@
           <a:bodyPr/>
           <a:lstStyle/>
           <a:p>
-            <a:endParaRPr lang="de-DE"/>
+            <a:endParaRPr lang="de-DE" dirty="0"/>
           </a:p>
         </p:txBody>
       </p:sp>
@@ -2137,7 +2124,7 @@
               <a:rPr lang="de-DE" smtClean="0"/>
               <a:t>‹Nr.›</a:t>
             </a:fld>
-            <a:endParaRPr lang="de-DE"/>
+            <a:endParaRPr lang="de-DE" dirty="0"/>
           </a:p>
         </p:txBody>
       </p:sp>
@@ -2199,7 +2186,6 @@
               <a:rPr lang="de-DE"/>
               <a:t>Titelmasterformat durch Klicken bearbeiten</a:t>
             </a:r>
-            <a:endParaRPr lang="de-DE"/>
           </a:p>
         </p:txBody>
       </p:sp>
@@ -2260,7 +2246,7 @@
             </a:lvl9pPr>
           </a:lstStyle>
           <a:p>
-            <a:endParaRPr lang="de-DE"/>
+            <a:endParaRPr lang="de-DE" dirty="0"/>
           </a:p>
         </p:txBody>
       </p:sp>
@@ -2346,9 +2332,9 @@
           <a:p>
             <a:fld id="{D1983C4C-34B0-4116-BBE6-05CA11AAA843}" type="datetimeFigureOut">
               <a:rPr lang="de-DE" smtClean="0"/>
-              <a:t>28.10.2016</a:t>
+              <a:t>31.10.2016</a:t>
             </a:fld>
-            <a:endParaRPr lang="de-DE"/>
+            <a:endParaRPr lang="de-DE" dirty="0"/>
           </a:p>
         </p:txBody>
       </p:sp>
@@ -2367,7 +2353,7 @@
           <a:bodyPr/>
           <a:lstStyle/>
           <a:p>
-            <a:endParaRPr lang="de-DE"/>
+            <a:endParaRPr lang="de-DE" dirty="0"/>
           </a:p>
         </p:txBody>
       </p:sp>
@@ -2390,7 +2376,7 @@
               <a:rPr lang="de-DE" smtClean="0"/>
               <a:t>‹Nr.›</a:t>
             </a:fld>
-            <a:endParaRPr lang="de-DE"/>
+            <a:endParaRPr lang="de-DE" dirty="0"/>
           </a:p>
         </p:txBody>
       </p:sp>
@@ -2458,7 +2444,6 @@
               <a:rPr lang="de-DE"/>
               <a:t>Titelmasterformat durch Klicken bearbeiten</a:t>
             </a:r>
-            <a:endParaRPr lang="de-DE"/>
           </a:p>
         </p:txBody>
       </p:sp>
@@ -2520,7 +2505,6 @@
               <a:rPr lang="de-DE"/>
               <a:t>Fünfte Ebene</a:t>
             </a:r>
-            <a:endParaRPr lang="de-DE"/>
           </a:p>
         </p:txBody>
       </p:sp>
@@ -2559,9 +2543,9 @@
           <a:p>
             <a:fld id="{D1983C4C-34B0-4116-BBE6-05CA11AAA843}" type="datetimeFigureOut">
               <a:rPr lang="de-DE" smtClean="0"/>
-              <a:t>28.10.2016</a:t>
+              <a:t>31.10.2016</a:t>
             </a:fld>
-            <a:endParaRPr lang="de-DE"/>
+            <a:endParaRPr lang="de-DE" dirty="0"/>
           </a:p>
         </p:txBody>
       </p:sp>
@@ -2598,7 +2582,7 @@
             </a:lvl1pPr>
           </a:lstStyle>
           <a:p>
-            <a:endParaRPr lang="de-DE"/>
+            <a:endParaRPr lang="de-DE" dirty="0"/>
           </a:p>
         </p:txBody>
       </p:sp>
@@ -2639,7 +2623,7 @@
               <a:rPr lang="de-DE" smtClean="0"/>
               <a:t>‹Nr.›</a:t>
             </a:fld>
-            <a:endParaRPr lang="de-DE"/>
+            <a:endParaRPr lang="de-DE" dirty="0"/>
           </a:p>
         </p:txBody>
       </p:sp>
@@ -3229,10 +3213,9 @@
             <a:p>
               <a:pPr algn="ctr"/>
               <a:r>
-                <a:rPr lang="de-DE" sz="1600" dirty="0" err="1"/>
+                <a:rPr lang="de-DE" sz="1600" dirty="0"/>
                 <a:t>CaminteJS</a:t>
               </a:r>
-              <a:endParaRPr lang="de-DE" sz="1600" dirty="0"/>
             </a:p>
           </p:txBody>
         </p:sp>
@@ -3270,7 +3253,7 @@
             <a:lstStyle/>
             <a:p>
               <a:pPr algn="ctr"/>
-              <a:endParaRPr lang="de-DE"/>
+              <a:endParaRPr lang="de-DE" dirty="0"/>
             </a:p>
           </p:txBody>
         </p:sp>
@@ -3309,27 +3292,15 @@
             <a:p>
               <a:pPr algn="ctr"/>
               <a:r>
-                <a:rPr lang="de-DE" sz="1600" i="1" dirty="0" err="1"/>
-                <a:t>Static</a:t>
-              </a:r>
-              <a:r>
                 <a:rPr lang="de-DE" sz="1600" i="1" dirty="0"/>
-                <a:t> Files:</a:t>
+                <a:t>Static Files:</a:t>
               </a:r>
             </a:p>
             <a:p>
               <a:pPr algn="ctr"/>
               <a:r>
                 <a:rPr lang="de-DE" sz="1600" dirty="0"/>
-                <a:t>HTML5, CSS3, JavaScript, </a:t>
-              </a:r>
-              <a:r>
-                <a:rPr lang="de-DE" sz="1600" dirty="0" err="1"/>
-                <a:t>jQuery</a:t>
-              </a:r>
-              <a:r>
-                <a:rPr lang="de-DE" sz="1600" dirty="0"/>
-                <a:t>, Twitter Bootstrap</a:t>
+                <a:t>HTML5, CSS3, JavaScript, jQuery, Twitter Bootstrap</a:t>
               </a:r>
             </a:p>
           </p:txBody>
@@ -3596,21 +3567,8 @@
           <a:p>
             <a:r>
               <a:rPr lang="de-DE" dirty="0"/>
-              <a:t>Fuldaflats.de High-level </a:t>
-            </a:r>
-            <a:r>
-              <a:rPr lang="de-DE" dirty="0" err="1"/>
-              <a:t>Architecture</a:t>
-            </a:r>
-            <a:r>
-              <a:rPr lang="de-DE" dirty="0"/>
-              <a:t> </a:t>
-            </a:r>
-            <a:r>
-              <a:rPr lang="de-DE" dirty="0" err="1"/>
-              <a:t>Diagram</a:t>
-            </a:r>
-            <a:endParaRPr lang="de-DE" dirty="0"/>
+              <a:t>Fuldaflats.de High-level Architecture Diagram</a:t>
+            </a:r>
           </a:p>
         </p:txBody>
       </p:sp>

</xml_diff>

<commit_message>
created merged milestone 1 document and added all subdocuments
</commit_message>
<xml_diff>
--- a/documentation/milestone1/07_architecture.pptx
+++ b/documentation/milestone1/07_architecture.pptx
@@ -241,7 +241,7 @@
           <a:p>
             <a:fld id="{D1983C4C-34B0-4116-BBE6-05CA11AAA843}" type="datetimeFigureOut">
               <a:rPr lang="de-DE" smtClean="0"/>
-              <a:t>31.10.2016</a:t>
+              <a:t>01.11.2016</a:t>
             </a:fld>
             <a:endParaRPr lang="de-DE" dirty="0"/>
           </a:p>
@@ -409,7 +409,7 @@
           <a:p>
             <a:fld id="{D1983C4C-34B0-4116-BBE6-05CA11AAA843}" type="datetimeFigureOut">
               <a:rPr lang="de-DE" smtClean="0"/>
-              <a:t>31.10.2016</a:t>
+              <a:t>01.11.2016</a:t>
             </a:fld>
             <a:endParaRPr lang="de-DE" dirty="0"/>
           </a:p>
@@ -587,7 +587,7 @@
           <a:p>
             <a:fld id="{D1983C4C-34B0-4116-BBE6-05CA11AAA843}" type="datetimeFigureOut">
               <a:rPr lang="de-DE" smtClean="0"/>
-              <a:t>31.10.2016</a:t>
+              <a:t>01.11.2016</a:t>
             </a:fld>
             <a:endParaRPr lang="de-DE" dirty="0"/>
           </a:p>
@@ -755,7 +755,7 @@
           <a:p>
             <a:fld id="{D1983C4C-34B0-4116-BBE6-05CA11AAA843}" type="datetimeFigureOut">
               <a:rPr lang="de-DE" smtClean="0"/>
-              <a:t>31.10.2016</a:t>
+              <a:t>01.11.2016</a:t>
             </a:fld>
             <a:endParaRPr lang="de-DE" dirty="0"/>
           </a:p>
@@ -1000,7 +1000,7 @@
           <a:p>
             <a:fld id="{D1983C4C-34B0-4116-BBE6-05CA11AAA843}" type="datetimeFigureOut">
               <a:rPr lang="de-DE" smtClean="0"/>
-              <a:t>31.10.2016</a:t>
+              <a:t>01.11.2016</a:t>
             </a:fld>
             <a:endParaRPr lang="de-DE" dirty="0"/>
           </a:p>
@@ -1229,7 +1229,7 @@
           <a:p>
             <a:fld id="{D1983C4C-34B0-4116-BBE6-05CA11AAA843}" type="datetimeFigureOut">
               <a:rPr lang="de-DE" smtClean="0"/>
-              <a:t>31.10.2016</a:t>
+              <a:t>01.11.2016</a:t>
             </a:fld>
             <a:endParaRPr lang="de-DE" dirty="0"/>
           </a:p>
@@ -1593,7 +1593,7 @@
           <a:p>
             <a:fld id="{D1983C4C-34B0-4116-BBE6-05CA11AAA843}" type="datetimeFigureOut">
               <a:rPr lang="de-DE" smtClean="0"/>
-              <a:t>31.10.2016</a:t>
+              <a:t>01.11.2016</a:t>
             </a:fld>
             <a:endParaRPr lang="de-DE" dirty="0"/>
           </a:p>
@@ -1710,7 +1710,7 @@
           <a:p>
             <a:fld id="{D1983C4C-34B0-4116-BBE6-05CA11AAA843}" type="datetimeFigureOut">
               <a:rPr lang="de-DE" smtClean="0"/>
-              <a:t>31.10.2016</a:t>
+              <a:t>01.11.2016</a:t>
             </a:fld>
             <a:endParaRPr lang="de-DE" dirty="0"/>
           </a:p>
@@ -1805,7 +1805,7 @@
           <a:p>
             <a:fld id="{D1983C4C-34B0-4116-BBE6-05CA11AAA843}" type="datetimeFigureOut">
               <a:rPr lang="de-DE" smtClean="0"/>
-              <a:t>31.10.2016</a:t>
+              <a:t>01.11.2016</a:t>
             </a:fld>
             <a:endParaRPr lang="de-DE" dirty="0"/>
           </a:p>
@@ -2080,7 +2080,7 @@
           <a:p>
             <a:fld id="{D1983C4C-34B0-4116-BBE6-05CA11AAA843}" type="datetimeFigureOut">
               <a:rPr lang="de-DE" smtClean="0"/>
-              <a:t>31.10.2016</a:t>
+              <a:t>01.11.2016</a:t>
             </a:fld>
             <a:endParaRPr lang="de-DE" dirty="0"/>
           </a:p>
@@ -2332,7 +2332,7 @@
           <a:p>
             <a:fld id="{D1983C4C-34B0-4116-BBE6-05CA11AAA843}" type="datetimeFigureOut">
               <a:rPr lang="de-DE" smtClean="0"/>
-              <a:t>31.10.2016</a:t>
+              <a:t>01.11.2016</a:t>
             </a:fld>
             <a:endParaRPr lang="de-DE" dirty="0"/>
           </a:p>
@@ -2543,7 +2543,7 @@
           <a:p>
             <a:fld id="{D1983C4C-34B0-4116-BBE6-05CA11AAA843}" type="datetimeFigureOut">
               <a:rPr lang="de-DE" smtClean="0"/>
-              <a:t>31.10.2016</a:t>
+              <a:t>01.11.2016</a:t>
             </a:fld>
             <a:endParaRPr lang="de-DE" dirty="0"/>
           </a:p>
@@ -3085,10 +3085,6 @@
             </a:p>
             <a:p>
               <a:pPr algn="ctr"/>
-              <a:endParaRPr lang="de-DE" sz="1600" dirty="0"/>
-            </a:p>
-            <a:p>
-              <a:pPr algn="ctr"/>
               <a:r>
                 <a:rPr lang="de-DE" sz="1600" dirty="0"/>
                 <a:t>Node.js</a:t>
@@ -3215,92 +3211,6 @@
               <a:r>
                 <a:rPr lang="de-DE" sz="1600" dirty="0"/>
                 <a:t>CaminteJS</a:t>
-              </a:r>
-            </a:p>
-          </p:txBody>
-        </p:sp>
-        <p:sp>
-          <p:nvSpPr>
-            <p:cNvPr id="15" name="Pfeil: nach rechts 14"/>
-            <p:cNvSpPr/>
-            <p:nvPr/>
-          </p:nvSpPr>
-          <p:spPr>
-            <a:xfrm flipH="1">
-              <a:off x="3649211" y="3601310"/>
-              <a:ext cx="3032841" cy="452812"/>
-            </a:xfrm>
-            <a:prstGeom prst="rightArrow">
-              <a:avLst/>
-            </a:prstGeom>
-          </p:spPr>
-          <p:style>
-            <a:lnRef idx="2">
-              <a:schemeClr val="dk1"/>
-            </a:lnRef>
-            <a:fillRef idx="1">
-              <a:schemeClr val="lt1"/>
-            </a:fillRef>
-            <a:effectRef idx="0">
-              <a:schemeClr val="dk1"/>
-            </a:effectRef>
-            <a:fontRef idx="minor">
-              <a:schemeClr val="dk1"/>
-            </a:fontRef>
-          </p:style>
-          <p:txBody>
-            <a:bodyPr rtlCol="0" anchor="ctr"/>
-            <a:lstStyle/>
-            <a:p>
-              <a:pPr algn="ctr"/>
-              <a:endParaRPr lang="de-DE" dirty="0"/>
-            </a:p>
-          </p:txBody>
-        </p:sp>
-        <p:sp>
-          <p:nvSpPr>
-            <p:cNvPr id="8" name="Rechteck: abgerundete Ecken 7"/>
-            <p:cNvSpPr/>
-            <p:nvPr/>
-          </p:nvSpPr>
-          <p:spPr>
-            <a:xfrm>
-              <a:off x="4197173" y="3331612"/>
-              <a:ext cx="2147581" cy="992208"/>
-            </a:xfrm>
-            <a:prstGeom prst="roundRect">
-              <a:avLst/>
-            </a:prstGeom>
-          </p:spPr>
-          <p:style>
-            <a:lnRef idx="2">
-              <a:schemeClr val="dk1"/>
-            </a:lnRef>
-            <a:fillRef idx="1">
-              <a:schemeClr val="lt1"/>
-            </a:fillRef>
-            <a:effectRef idx="0">
-              <a:schemeClr val="dk1"/>
-            </a:effectRef>
-            <a:fontRef idx="minor">
-              <a:schemeClr val="dk1"/>
-            </a:fontRef>
-          </p:style>
-          <p:txBody>
-            <a:bodyPr rtlCol="0" anchor="ctr"/>
-            <a:lstStyle/>
-            <a:p>
-              <a:pPr algn="ctr"/>
-              <a:r>
-                <a:rPr lang="de-DE" sz="1600" i="1" dirty="0"/>
-                <a:t>Static Files:</a:t>
-              </a:r>
-            </a:p>
-            <a:p>
-              <a:pPr algn="ctr"/>
-              <a:r>
-                <a:rPr lang="de-DE" sz="1600" dirty="0"/>
-                <a:t>HTML5, CSS3, JavaScript, jQuery, Twitter Bootstrap</a:t>
               </a:r>
             </a:p>
           </p:txBody>
@@ -3542,7 +3452,134 @@
             </a:p>
           </p:txBody>
         </p:sp>
+        <p:sp>
+          <p:nvSpPr>
+            <p:cNvPr id="15" name="Pfeil: nach rechts 14"/>
+            <p:cNvSpPr/>
+            <p:nvPr/>
+          </p:nvSpPr>
+          <p:spPr>
+            <a:xfrm flipH="1">
+              <a:off x="3649211" y="3601310"/>
+              <a:ext cx="3032841" cy="452812"/>
+            </a:xfrm>
+            <a:prstGeom prst="rightArrow">
+              <a:avLst/>
+            </a:prstGeom>
+          </p:spPr>
+          <p:style>
+            <a:lnRef idx="2">
+              <a:schemeClr val="dk1"/>
+            </a:lnRef>
+            <a:fillRef idx="1">
+              <a:schemeClr val="lt1"/>
+            </a:fillRef>
+            <a:effectRef idx="0">
+              <a:schemeClr val="dk1"/>
+            </a:effectRef>
+            <a:fontRef idx="minor">
+              <a:schemeClr val="dk1"/>
+            </a:fontRef>
+          </p:style>
+          <p:txBody>
+            <a:bodyPr rtlCol="0" anchor="ctr"/>
+            <a:lstStyle/>
+            <a:p>
+              <a:pPr algn="ctr"/>
+              <a:endParaRPr lang="de-DE" dirty="0"/>
+            </a:p>
+          </p:txBody>
+        </p:sp>
+        <p:sp>
+          <p:nvSpPr>
+            <p:cNvPr id="8" name="Rechteck: abgerundete Ecken 7"/>
+            <p:cNvSpPr/>
+            <p:nvPr/>
+          </p:nvSpPr>
+          <p:spPr>
+            <a:xfrm>
+              <a:off x="4197173" y="3331612"/>
+              <a:ext cx="1540527" cy="992208"/>
+            </a:xfrm>
+            <a:prstGeom prst="roundRect">
+              <a:avLst/>
+            </a:prstGeom>
+          </p:spPr>
+          <p:style>
+            <a:lnRef idx="2">
+              <a:schemeClr val="dk1"/>
+            </a:lnRef>
+            <a:fillRef idx="1">
+              <a:schemeClr val="lt1"/>
+            </a:fillRef>
+            <a:effectRef idx="0">
+              <a:schemeClr val="dk1"/>
+            </a:effectRef>
+            <a:fontRef idx="minor">
+              <a:schemeClr val="dk1"/>
+            </a:fontRef>
+          </p:style>
+          <p:txBody>
+            <a:bodyPr rtlCol="0" anchor="ctr"/>
+            <a:lstStyle/>
+            <a:p>
+              <a:pPr algn="ctr"/>
+              <a:r>
+                <a:rPr lang="de-DE" sz="1600" dirty="0"/>
+                <a:t>HTML5, CSS3, JavaScript, jQuery, Twitter Bootstrap</a:t>
+              </a:r>
+            </a:p>
+          </p:txBody>
+        </p:sp>
       </p:grpSp>
+      <p:sp>
+        <p:nvSpPr>
+          <p:cNvPr id="21" name="Flussdiagramm: Verzögerung 20"/>
+          <p:cNvSpPr/>
+          <p:nvPr/>
+        </p:nvSpPr>
+        <p:spPr>
+          <a:xfrm flipH="1">
+            <a:off x="5824013" y="4255630"/>
+            <a:ext cx="1107568" cy="795171"/>
+          </a:xfrm>
+          <a:prstGeom prst="flowChartDelay">
+            <a:avLst/>
+          </a:prstGeom>
+        </p:spPr>
+        <p:style>
+          <a:lnRef idx="2">
+            <a:schemeClr val="dk1"/>
+          </a:lnRef>
+          <a:fillRef idx="1">
+            <a:schemeClr val="lt1"/>
+          </a:fillRef>
+          <a:effectRef idx="0">
+            <a:schemeClr val="dk1"/>
+          </a:effectRef>
+          <a:fontRef idx="minor">
+            <a:schemeClr val="dk1"/>
+          </a:fontRef>
+        </p:style>
+        <p:txBody>
+          <a:bodyPr rtlCol="0" anchor="ctr"/>
+          <a:lstStyle/>
+          <a:p>
+            <a:pPr algn="ctr"/>
+            <a:r>
+              <a:rPr lang="de-DE" sz="1600" dirty="0"/>
+              <a:t>Express </a:t>
+            </a:r>
+          </a:p>
+          <a:p>
+            <a:pPr algn="ctr"/>
+            <a:r>
+              <a:rPr lang="de-DE" sz="1600" dirty="0"/>
+              <a:t>Static Files</a:t>
+            </a:r>
+          </a:p>
+        </p:txBody>
+      </p:sp>
       <p:sp>
         <p:nvSpPr>
           <p:cNvPr id="20" name="Textfeld 19"/>

</xml_diff>